<commit_message>
heatmap for cc-pvdz added
</commit_message>
<xml_diff>
--- a/hexabenzocoronene/sto3g/correlation/n_and_q_correlation.pptx
+++ b/hexabenzocoronene/sto3g/correlation/n_and_q_correlation.pptx
@@ -3423,10 +3423,10 @@
         </p:nvGrpSpPr>
         <p:grpSpPr>
           <a:xfrm>
-            <a:off x="206814" y="80378"/>
-            <a:ext cx="4324100" cy="4324101"/>
-            <a:chOff x="22351" y="-216875"/>
-            <a:chExt cx="4231241" cy="4788875"/>
+            <a:off x="4324167" y="448938"/>
+            <a:ext cx="3914758" cy="3871481"/>
+            <a:chOff x="-83263" y="-4414"/>
+            <a:chExt cx="4241044" cy="4568447"/>
           </a:xfrm>
         </p:grpSpPr>
         <p:pic>
@@ -3443,444 +3443,169 @@
             </p:cNvPicPr>
             <p:nvPr/>
           </p:nvPicPr>
-          <p:blipFill>
+          <p:blipFill rotWithShape="1">
             <a:blip r:embed="rId3"/>
-            <a:srcRect/>
+            <a:srcRect t="6917"/>
             <a:stretch/>
           </p:blipFill>
           <p:spPr>
             <a:xfrm>
-              <a:off x="22351" y="-216875"/>
-              <a:ext cx="4231241" cy="4788875"/>
+              <a:off x="-83263" y="-4414"/>
+              <a:ext cx="4241044" cy="4467976"/>
             </a:xfrm>
             <a:prstGeom prst="rect">
               <a:avLst/>
             </a:prstGeom>
           </p:spPr>
         </p:pic>
-        <p:grpSp>
-          <p:nvGrpSpPr>
-            <p:cNvPr id="42" name="Group 41">
-              <a:extLst>
-                <a:ext uri="{FF2B5EF4-FFF2-40B4-BE49-F238E27FC236}">
-                  <a16:creationId xmlns:a16="http://schemas.microsoft.com/office/drawing/2014/main" id="{4F361466-E58E-5408-CBD9-34C4CEF2BE6A}"/>
-                </a:ext>
-              </a:extLst>
-            </p:cNvPr>
-            <p:cNvGrpSpPr/>
-            <p:nvPr/>
-          </p:nvGrpSpPr>
-          <p:grpSpPr>
-            <a:xfrm>
-              <a:off x="285002" y="686128"/>
-              <a:ext cx="3369104" cy="3768290"/>
-              <a:chOff x="255182" y="2333015"/>
-              <a:chExt cx="3369104" cy="3768290"/>
-            </a:xfrm>
-          </p:grpSpPr>
-          <p:sp>
-            <p:nvSpPr>
-              <p:cNvPr id="24" name="TextBox 23">
-                <a:extLst>
-                  <a:ext uri="{FF2B5EF4-FFF2-40B4-BE49-F238E27FC236}">
-                    <a16:creationId xmlns:a16="http://schemas.microsoft.com/office/drawing/2014/main" id="{79E5351C-144B-AF88-48E7-C28EA205740A}"/>
-                  </a:ext>
-                </a:extLst>
-              </p:cNvPr>
-              <p:cNvSpPr txBox="1"/>
-              <p:nvPr/>
-            </p:nvSpPr>
-            <p:spPr>
-              <a:xfrm>
-                <a:off x="255182" y="2333015"/>
-                <a:ext cx="270998" cy="249536"/>
-              </a:xfrm>
-              <a:prstGeom prst="rect">
-                <a:avLst/>
-              </a:prstGeom>
-              <a:noFill/>
-            </p:spPr>
-            <p:txBody>
-              <a:bodyPr wrap="square" rtlCol="0">
-                <a:spAutoFit/>
-              </a:bodyPr>
-              <a:lstStyle/>
-              <a:p>
-                <a:r>
-                  <a:rPr lang="en-US" sz="864" dirty="0">
-                    <a:latin typeface="Helvetica Neue" panose="02000503000000020004" pitchFamily="2" charset="0"/>
-                    <a:ea typeface="Helvetica Neue" panose="02000503000000020004" pitchFamily="2" charset="0"/>
-                    <a:cs typeface="Helvetica Neue" panose="02000503000000020004" pitchFamily="2" charset="0"/>
-                  </a:rPr>
-                  <a:t>1</a:t>
-                </a:r>
-              </a:p>
-            </p:txBody>
-          </p:sp>
-          <p:sp>
-            <p:nvSpPr>
-              <p:cNvPr id="25" name="TextBox 24">
-                <a:extLst>
-                  <a:ext uri="{FF2B5EF4-FFF2-40B4-BE49-F238E27FC236}">
-                    <a16:creationId xmlns:a16="http://schemas.microsoft.com/office/drawing/2014/main" id="{53EF9C7F-5A31-CF34-9001-6CB3F8C89FB7}"/>
-                  </a:ext>
-                </a:extLst>
-              </p:cNvPr>
-              <p:cNvSpPr txBox="1"/>
-              <p:nvPr/>
-            </p:nvSpPr>
-            <p:spPr>
-              <a:xfrm>
-                <a:off x="691586" y="2817995"/>
-                <a:ext cx="270998" cy="249536"/>
-              </a:xfrm>
-              <a:prstGeom prst="rect">
-                <a:avLst/>
-              </a:prstGeom>
-              <a:noFill/>
-            </p:spPr>
-            <p:txBody>
-              <a:bodyPr wrap="square" rtlCol="0">
-                <a:spAutoFit/>
-              </a:bodyPr>
-              <a:lstStyle/>
-              <a:p>
-                <a:r>
-                  <a:rPr lang="en-US" sz="864" dirty="0">
-                    <a:latin typeface="Helvetica Neue" panose="02000503000000020004" pitchFamily="2" charset="0"/>
-                    <a:ea typeface="Helvetica Neue" panose="02000503000000020004" pitchFamily="2" charset="0"/>
-                    <a:cs typeface="Helvetica Neue" panose="02000503000000020004" pitchFamily="2" charset="0"/>
-                  </a:rPr>
-                  <a:t>2</a:t>
-                </a:r>
-              </a:p>
-            </p:txBody>
-          </p:sp>
-          <p:sp>
-            <p:nvSpPr>
-              <p:cNvPr id="26" name="TextBox 25">
-                <a:extLst>
-                  <a:ext uri="{FF2B5EF4-FFF2-40B4-BE49-F238E27FC236}">
-                    <a16:creationId xmlns:a16="http://schemas.microsoft.com/office/drawing/2014/main" id="{97A57BF7-DBFB-AF9D-D21B-E982BEB0CB6A}"/>
-                  </a:ext>
-                </a:extLst>
-              </p:cNvPr>
-              <p:cNvSpPr txBox="1"/>
-              <p:nvPr/>
-            </p:nvSpPr>
-            <p:spPr>
-              <a:xfrm>
-                <a:off x="1127990" y="3321502"/>
-                <a:ext cx="270998" cy="249536"/>
-              </a:xfrm>
-              <a:prstGeom prst="rect">
-                <a:avLst/>
-              </a:prstGeom>
-              <a:noFill/>
-            </p:spPr>
-            <p:txBody>
-              <a:bodyPr wrap="square" rtlCol="0">
-                <a:spAutoFit/>
-              </a:bodyPr>
-              <a:lstStyle/>
-              <a:p>
-                <a:r>
-                  <a:rPr lang="en-US" sz="864" dirty="0">
-                    <a:latin typeface="Helvetica Neue" panose="02000503000000020004" pitchFamily="2" charset="0"/>
-                    <a:ea typeface="Helvetica Neue" panose="02000503000000020004" pitchFamily="2" charset="0"/>
-                    <a:cs typeface="Helvetica Neue" panose="02000503000000020004" pitchFamily="2" charset="0"/>
-                  </a:rPr>
-                  <a:t>3</a:t>
-                </a:r>
-              </a:p>
-            </p:txBody>
-          </p:sp>
-          <p:sp>
-            <p:nvSpPr>
-              <p:cNvPr id="27" name="TextBox 26">
-                <a:extLst>
-                  <a:ext uri="{FF2B5EF4-FFF2-40B4-BE49-F238E27FC236}">
-                    <a16:creationId xmlns:a16="http://schemas.microsoft.com/office/drawing/2014/main" id="{4ABB80AC-80BC-205A-74A2-9DED05D0556F}"/>
-                  </a:ext>
-                </a:extLst>
-              </p:cNvPr>
-              <p:cNvSpPr txBox="1"/>
-              <p:nvPr/>
-            </p:nvSpPr>
-            <p:spPr>
-              <a:xfrm>
-                <a:off x="1577804" y="3754635"/>
-                <a:ext cx="270998" cy="249536"/>
-              </a:xfrm>
-              <a:prstGeom prst="rect">
-                <a:avLst/>
-              </a:prstGeom>
-              <a:noFill/>
-            </p:spPr>
-            <p:txBody>
-              <a:bodyPr wrap="square" rtlCol="0">
-                <a:spAutoFit/>
-              </a:bodyPr>
-              <a:lstStyle/>
-              <a:p>
-                <a:r>
-                  <a:rPr lang="en-US" sz="864" dirty="0">
-                    <a:latin typeface="Helvetica Neue" panose="02000503000000020004" pitchFamily="2" charset="0"/>
-                    <a:ea typeface="Helvetica Neue" panose="02000503000000020004" pitchFamily="2" charset="0"/>
-                    <a:cs typeface="Helvetica Neue" panose="02000503000000020004" pitchFamily="2" charset="0"/>
-                  </a:rPr>
-                  <a:t>4</a:t>
-                </a:r>
-              </a:p>
-            </p:txBody>
-          </p:sp>
-          <p:sp>
-            <p:nvSpPr>
-              <p:cNvPr id="28" name="TextBox 27">
-                <a:extLst>
-                  <a:ext uri="{FF2B5EF4-FFF2-40B4-BE49-F238E27FC236}">
-                    <a16:creationId xmlns:a16="http://schemas.microsoft.com/office/drawing/2014/main" id="{8D083252-B74F-29D0-D67D-CC780AEB0F88}"/>
-                  </a:ext>
-                </a:extLst>
-              </p:cNvPr>
-              <p:cNvSpPr txBox="1"/>
-              <p:nvPr/>
-            </p:nvSpPr>
-            <p:spPr>
-              <a:xfrm>
-                <a:off x="2010508" y="4212615"/>
-                <a:ext cx="270998" cy="249536"/>
-              </a:xfrm>
-              <a:prstGeom prst="rect">
-                <a:avLst/>
-              </a:prstGeom>
-              <a:noFill/>
-            </p:spPr>
-            <p:txBody>
-              <a:bodyPr wrap="square" rtlCol="0">
-                <a:spAutoFit/>
-              </a:bodyPr>
-              <a:lstStyle/>
-              <a:p>
-                <a:r>
-                  <a:rPr lang="en-US" sz="864" dirty="0">
-                    <a:latin typeface="Helvetica Neue" panose="02000503000000020004" pitchFamily="2" charset="0"/>
-                    <a:ea typeface="Helvetica Neue" panose="02000503000000020004" pitchFamily="2" charset="0"/>
-                    <a:cs typeface="Helvetica Neue" panose="02000503000000020004" pitchFamily="2" charset="0"/>
-                  </a:rPr>
-                  <a:t>5</a:t>
-                </a:r>
-              </a:p>
-            </p:txBody>
-          </p:sp>
-          <p:sp>
-            <p:nvSpPr>
-              <p:cNvPr id="30" name="TextBox 29">
-                <a:extLst>
-                  <a:ext uri="{FF2B5EF4-FFF2-40B4-BE49-F238E27FC236}">
-                    <a16:creationId xmlns:a16="http://schemas.microsoft.com/office/drawing/2014/main" id="{3A052024-D472-1B5F-01EC-39050F8C196B}"/>
-                  </a:ext>
-                </a:extLst>
-              </p:cNvPr>
-              <p:cNvSpPr txBox="1"/>
-              <p:nvPr/>
-            </p:nvSpPr>
-            <p:spPr>
-              <a:xfrm>
-                <a:off x="2448658" y="4657484"/>
-                <a:ext cx="270998" cy="249536"/>
-              </a:xfrm>
-              <a:prstGeom prst="rect">
-                <a:avLst/>
-              </a:prstGeom>
-              <a:noFill/>
-            </p:spPr>
-            <p:txBody>
-              <a:bodyPr wrap="square" rtlCol="0">
-                <a:spAutoFit/>
-              </a:bodyPr>
-              <a:lstStyle/>
-              <a:p>
-                <a:r>
-                  <a:rPr lang="en-US" sz="864" dirty="0">
-                    <a:latin typeface="Helvetica Neue" panose="02000503000000020004" pitchFamily="2" charset="0"/>
-                    <a:ea typeface="Helvetica Neue" panose="02000503000000020004" pitchFamily="2" charset="0"/>
-                    <a:cs typeface="Helvetica Neue" panose="02000503000000020004" pitchFamily="2" charset="0"/>
-                  </a:rPr>
-                  <a:t>6</a:t>
-                </a:r>
-              </a:p>
-            </p:txBody>
-          </p:sp>
-          <p:sp>
-            <p:nvSpPr>
-              <p:cNvPr id="31" name="TextBox 30">
-                <a:extLst>
-                  <a:ext uri="{FF2B5EF4-FFF2-40B4-BE49-F238E27FC236}">
-                    <a16:creationId xmlns:a16="http://schemas.microsoft.com/office/drawing/2014/main" id="{7E4FC1CD-8026-6D2B-63AC-10854C2B2F89}"/>
-                  </a:ext>
-                </a:extLst>
-              </p:cNvPr>
-              <p:cNvSpPr txBox="1"/>
-              <p:nvPr/>
-            </p:nvSpPr>
-            <p:spPr>
-              <a:xfrm>
-                <a:off x="2871728" y="5153346"/>
-                <a:ext cx="270998" cy="249536"/>
-              </a:xfrm>
-              <a:prstGeom prst="rect">
-                <a:avLst/>
-              </a:prstGeom>
-              <a:noFill/>
-            </p:spPr>
-            <p:txBody>
-              <a:bodyPr wrap="square" rtlCol="0">
-                <a:spAutoFit/>
-              </a:bodyPr>
-              <a:lstStyle/>
-              <a:p>
-                <a:r>
-                  <a:rPr lang="en-US" sz="864" dirty="0">
-                    <a:latin typeface="Helvetica Neue" panose="02000503000000020004" pitchFamily="2" charset="0"/>
-                    <a:ea typeface="Helvetica Neue" panose="02000503000000020004" pitchFamily="2" charset="0"/>
-                    <a:cs typeface="Helvetica Neue" panose="02000503000000020004" pitchFamily="2" charset="0"/>
-                  </a:rPr>
-                  <a:t>7</a:t>
-                </a:r>
-              </a:p>
-            </p:txBody>
-          </p:sp>
-          <mc:AlternateContent xmlns:mc="http://schemas.openxmlformats.org/markup-compatibility/2006">
-            <mc:Choice xmlns:a14="http://schemas.microsoft.com/office/drawing/2010/main" Requires="a14">
-              <p:sp>
-                <p:nvSpPr>
-                  <p:cNvPr id="39" name="TextBox 38">
-                    <a:extLst>
-                      <a:ext uri="{FF2B5EF4-FFF2-40B4-BE49-F238E27FC236}">
-                        <a16:creationId xmlns:a16="http://schemas.microsoft.com/office/drawing/2014/main" id="{DD2D27D3-A8DC-274C-7EF0-967E6302B41B}"/>
-                      </a:ext>
-                    </a:extLst>
-                  </p:cNvPr>
-                  <p:cNvSpPr txBox="1"/>
-                  <p:nvPr/>
-                </p:nvSpPr>
-                <p:spPr>
-                  <a:xfrm>
-                    <a:off x="337598" y="5753985"/>
-                    <a:ext cx="3286688" cy="347320"/>
-                  </a:xfrm>
-                  <a:prstGeom prst="rect">
-                    <a:avLst/>
-                  </a:prstGeom>
-                  <a:noFill/>
-                </p:spPr>
-                <p:txBody>
-                  <a:bodyPr wrap="square" rtlCol="0">
-                    <a:spAutoFit/>
-                  </a:bodyPr>
-                  <a:lstStyle/>
-                  <a:p>
-                    <a:r>
-                      <a:rPr lang="en-US" sz="1400" dirty="0"/>
-                      <a:t> </a:t>
-                    </a:r>
-                    <a:r>
-                      <a:rPr lang="en-US" sz="1400" dirty="0">
-                        <a:latin typeface="Helvetica Neue" panose="02000503000000020004" pitchFamily="2" charset="0"/>
-                        <a:ea typeface="Helvetica Neue" panose="02000503000000020004" pitchFamily="2" charset="0"/>
-                        <a:cs typeface="Helvetica Neue" panose="02000503000000020004" pitchFamily="2" charset="0"/>
-                      </a:rPr>
-                      <a:t>(a)</a:t>
-                    </a:r>
-                    <a:r>
-                      <a:rPr lang="en-US" sz="1400" dirty="0"/>
-                      <a:t> </a:t>
-                    </a:r>
-                    <a14:m>
-                      <m:oMath xmlns:m="http://schemas.openxmlformats.org/officeDocument/2006/math">
-                        <m:acc>
-                          <m:accPr>
-                            <m:chr m:val="̂"/>
-                            <m:ctrlPr>
-                              <a:rPr lang="en-US" sz="1400" i="1">
-                                <a:latin typeface="Cambria Math" panose="02040503050406030204" pitchFamily="18" charset="0"/>
-                              </a:rPr>
-                            </m:ctrlPr>
-                          </m:accPr>
-                          <m:e>
-                            <m:r>
-                              <a:rPr lang="en-US" sz="1400" i="1">
-                                <a:latin typeface="Cambria Math" panose="02040503050406030204" pitchFamily="18" charset="0"/>
-                              </a:rPr>
-                              <m:t>𝑁</m:t>
-                            </m:r>
-                          </m:e>
-                        </m:acc>
-                        <m:r>
-                          <a:rPr lang="en-US" sz="1400" i="1">
-                            <a:latin typeface="Cambria Math" panose="02040503050406030204" pitchFamily="18" charset="0"/>
-                          </a:rPr>
-                          <m:t> </m:t>
-                        </m:r>
-                      </m:oMath>
-                    </a14:m>
-                    <a:r>
-                      <a:rPr lang="en-US" sz="1400" dirty="0">
-                        <a:latin typeface="Helvetica Neue" panose="02000503000000020004" pitchFamily="2" charset="0"/>
-                      </a:rPr>
-                      <a:t> operator correlation</a:t>
-                    </a:r>
-                  </a:p>
-                </p:txBody>
-              </p:sp>
-            </mc:Choice>
-            <mc:Fallback>
-              <p:sp>
-                <p:nvSpPr>
-                  <p:cNvPr id="39" name="TextBox 38">
-                    <a:extLst>
-                      <a:ext uri="{FF2B5EF4-FFF2-40B4-BE49-F238E27FC236}">
-                        <a16:creationId xmlns:a16="http://schemas.microsoft.com/office/drawing/2014/main" id="{DD2D27D3-A8DC-274C-7EF0-967E6302B41B}"/>
-                      </a:ext>
-                    </a:extLst>
-                  </p:cNvPr>
-                  <p:cNvSpPr txBox="1">
-                    <a:spLocks noRot="1" noChangeAspect="1" noMove="1" noResize="1" noEditPoints="1" noAdjustHandles="1" noChangeArrowheads="1" noChangeShapeType="1" noTextEdit="1"/>
-                  </p:cNvSpPr>
-                  <p:nvPr/>
-                </p:nvSpPr>
-                <p:spPr>
-                  <a:xfrm>
-                    <a:off x="337598" y="5753985"/>
-                    <a:ext cx="3286688" cy="347320"/>
-                  </a:xfrm>
-                  <a:prstGeom prst="rect">
-                    <a:avLst/>
-                  </a:prstGeom>
-                  <a:blipFill>
-                    <a:blip r:embed="rId4"/>
-                    <a:stretch>
-                      <a:fillRect t="-3846" b="-19231"/>
-                    </a:stretch>
-                  </a:blipFill>
-                </p:spPr>
-                <p:txBody>
-                  <a:bodyPr/>
-                  <a:lstStyle/>
-                  <a:p>
-                    <a:r>
-                      <a:rPr lang="en-US">
-                        <a:noFill/>
-                      </a:rPr>
-                      <a:t> </a:t>
-                    </a:r>
-                  </a:p>
-                </p:txBody>
-              </p:sp>
-            </mc:Fallback>
-          </mc:AlternateContent>
-        </p:grpSp>
+        <mc:AlternateContent xmlns:mc="http://schemas.openxmlformats.org/markup-compatibility/2006">
+          <mc:Choice xmlns:a14="http://schemas.microsoft.com/office/drawing/2010/main" Requires="a14">
+            <p:sp>
+              <p:nvSpPr>
+                <p:cNvPr id="39" name="TextBox 38">
+                  <a:extLst>
+                    <a:ext uri="{FF2B5EF4-FFF2-40B4-BE49-F238E27FC236}">
+                      <a16:creationId xmlns:a16="http://schemas.microsoft.com/office/drawing/2014/main" id="{DD2D27D3-A8DC-274C-7EF0-967E6302B41B}"/>
+                    </a:ext>
+                  </a:extLst>
+                </p:cNvPr>
+                <p:cNvSpPr txBox="1"/>
+                <p:nvPr/>
+              </p:nvSpPr>
+              <p:spPr>
+                <a:xfrm>
+                  <a:off x="-25725" y="4117089"/>
+                  <a:ext cx="3286687" cy="446944"/>
+                </a:xfrm>
+                <a:prstGeom prst="rect">
+                  <a:avLst/>
+                </a:prstGeom>
+                <a:noFill/>
+              </p:spPr>
+              <p:txBody>
+                <a:bodyPr wrap="square" rtlCol="0">
+                  <a:spAutoFit/>
+                </a:bodyPr>
+                <a:lstStyle/>
+                <a:p>
+                  <a:r>
+                    <a:rPr lang="en-US" dirty="0"/>
+                    <a:t> </a:t>
+                  </a:r>
+                  <a:r>
+                    <a:rPr lang="en-US" dirty="0">
+                      <a:latin typeface="Helvetica Neue" panose="02000503000000020004" pitchFamily="2" charset="0"/>
+                      <a:ea typeface="Helvetica Neue" panose="02000503000000020004" pitchFamily="2" charset="0"/>
+                      <a:cs typeface="Helvetica Neue" panose="02000503000000020004" pitchFamily="2" charset="0"/>
+                    </a:rPr>
+                    <a:t>(a)</a:t>
+                  </a:r>
+                  <a:r>
+                    <a:rPr lang="en-US" dirty="0"/>
+                    <a:t> </a:t>
+                  </a:r>
+                  <a14:m>
+                    <m:oMath xmlns:m="http://schemas.openxmlformats.org/officeDocument/2006/math">
+                      <m:sSup>
+                        <m:sSupPr>
+                          <m:ctrlPr>
+                            <a:rPr lang="en-US" b="0" i="1" smtClean="0">
+                              <a:latin typeface="Cambria Math" panose="02040503050406030204" pitchFamily="18" charset="0"/>
+                            </a:rPr>
+                          </m:ctrlPr>
+                        </m:sSupPr>
+                        <m:e>
+                          <m:acc>
+                            <m:accPr>
+                              <m:chr m:val="̂"/>
+                              <m:ctrlPr>
+                                <a:rPr lang="en-US" i="1">
+                                  <a:latin typeface="Cambria Math" panose="02040503050406030204" pitchFamily="18" charset="0"/>
+                                </a:rPr>
+                              </m:ctrlPr>
+                            </m:accPr>
+                            <m:e>
+                              <m:r>
+                                <a:rPr lang="en-US" b="0" i="1" smtClean="0">
+                                  <a:latin typeface="Cambria Math" panose="02040503050406030204" pitchFamily="18" charset="0"/>
+                                </a:rPr>
+                                <m:t>𝑆</m:t>
+                              </m:r>
+                            </m:e>
+                          </m:acc>
+                        </m:e>
+                        <m:sup>
+                          <m:r>
+                            <a:rPr lang="en-US" b="0" i="1" smtClean="0">
+                              <a:latin typeface="Cambria Math" panose="02040503050406030204" pitchFamily="18" charset="0"/>
+                            </a:rPr>
+                            <m:t>𝑧</m:t>
+                          </m:r>
+                        </m:sup>
+                      </m:sSup>
+                      <m:r>
+                        <a:rPr lang="en-US" i="1">
+                          <a:latin typeface="Cambria Math" panose="02040503050406030204" pitchFamily="18" charset="0"/>
+                        </a:rPr>
+                        <m:t> </m:t>
+                      </m:r>
+                    </m:oMath>
+                  </a14:m>
+                  <a:r>
+                    <a:rPr lang="en-US" dirty="0">
+                      <a:latin typeface="Helvetica Neue" panose="02000503000000020004" pitchFamily="2" charset="0"/>
+                    </a:rPr>
+                    <a:t> operator covariance</a:t>
+                  </a:r>
+                </a:p>
+              </p:txBody>
+            </p:sp>
+          </mc:Choice>
+          <mc:Fallback>
+            <p:sp>
+              <p:nvSpPr>
+                <p:cNvPr id="39" name="TextBox 38">
+                  <a:extLst>
+                    <a:ext uri="{FF2B5EF4-FFF2-40B4-BE49-F238E27FC236}">
+                      <a16:creationId xmlns:a16="http://schemas.microsoft.com/office/drawing/2014/main" id="{DD2D27D3-A8DC-274C-7EF0-967E6302B41B}"/>
+                    </a:ext>
+                  </a:extLst>
+                </p:cNvPr>
+                <p:cNvSpPr txBox="1">
+                  <a:spLocks noRot="1" noChangeAspect="1" noMove="1" noResize="1" noEditPoints="1" noAdjustHandles="1" noChangeArrowheads="1" noChangeShapeType="1" noTextEdit="1"/>
+                </p:cNvSpPr>
+                <p:nvPr/>
+              </p:nvSpPr>
+              <p:spPr>
+                <a:xfrm>
+                  <a:off x="-25725" y="4117089"/>
+                  <a:ext cx="3286687" cy="446944"/>
+                </a:xfrm>
+                <a:prstGeom prst="rect">
+                  <a:avLst/>
+                </a:prstGeom>
+                <a:blipFill>
+                  <a:blip r:embed="rId4"/>
+                  <a:stretch>
+                    <a:fillRect t="-6452" b="-22581"/>
+                  </a:stretch>
+                </a:blipFill>
+              </p:spPr>
+              <p:txBody>
+                <a:bodyPr/>
+                <a:lstStyle/>
+                <a:p>
+                  <a:r>
+                    <a:rPr lang="en-US">
+                      <a:noFill/>
+                    </a:rPr>
+                    <a:t> </a:t>
+                  </a:r>
+                </a:p>
+              </p:txBody>
+            </p:sp>
+          </mc:Fallback>
+        </mc:AlternateContent>
       </p:grpSp>
       <p:grpSp>
         <p:nvGrpSpPr>
@@ -3896,10 +3621,10 @@
         </p:nvGrpSpPr>
         <p:grpSpPr>
           <a:xfrm>
-            <a:off x="7812372" y="40575"/>
-            <a:ext cx="4100492" cy="4460607"/>
-            <a:chOff x="8035453" y="336101"/>
-            <a:chExt cx="4205148" cy="4720758"/>
+            <a:off x="8292036" y="235754"/>
+            <a:ext cx="3681132" cy="4084537"/>
+            <a:chOff x="8035453" y="410479"/>
+            <a:chExt cx="4205148" cy="4590477"/>
           </a:xfrm>
         </p:grpSpPr>
         <p:pic>
@@ -3918,441 +3643,179 @@
           </p:nvPicPr>
           <p:blipFill>
             <a:blip r:embed="rId5"/>
-            <a:srcRect l="2541" r="2541"/>
+            <a:srcRect l="4037" r="4037"/>
             <a:stretch/>
           </p:blipFill>
           <p:spPr>
             <a:xfrm>
-              <a:off x="8035453" y="336101"/>
-              <a:ext cx="4205148" cy="4720758"/>
+              <a:off x="8035453" y="410479"/>
+              <a:ext cx="4205148" cy="4572002"/>
             </a:xfrm>
             <a:prstGeom prst="rect">
               <a:avLst/>
             </a:prstGeom>
           </p:spPr>
         </p:pic>
-        <p:grpSp>
-          <p:nvGrpSpPr>
-            <p:cNvPr id="43" name="Group 42">
-              <a:extLst>
-                <a:ext uri="{FF2B5EF4-FFF2-40B4-BE49-F238E27FC236}">
-                  <a16:creationId xmlns:a16="http://schemas.microsoft.com/office/drawing/2014/main" id="{17A1A28A-1825-6695-D89C-8441FDF7496F}"/>
-                </a:ext>
-              </a:extLst>
-            </p:cNvPr>
-            <p:cNvGrpSpPr/>
-            <p:nvPr/>
-          </p:nvGrpSpPr>
-          <p:grpSpPr>
-            <a:xfrm>
-              <a:off x="8161531" y="1219294"/>
-              <a:ext cx="3098524" cy="3624353"/>
-              <a:chOff x="8161531" y="2362293"/>
-              <a:chExt cx="3098524" cy="3624353"/>
-            </a:xfrm>
-          </p:grpSpPr>
-          <p:sp>
-            <p:nvSpPr>
-              <p:cNvPr id="32" name="TextBox 31">
-                <a:extLst>
-                  <a:ext uri="{FF2B5EF4-FFF2-40B4-BE49-F238E27FC236}">
-                    <a16:creationId xmlns:a16="http://schemas.microsoft.com/office/drawing/2014/main" id="{B3B02E89-175E-A12E-7EE0-C6ECC9FFCF3D}"/>
-                  </a:ext>
-                </a:extLst>
-              </p:cNvPr>
-              <p:cNvSpPr txBox="1"/>
-              <p:nvPr/>
-            </p:nvSpPr>
-            <p:spPr>
-              <a:xfrm>
-                <a:off x="8161531" y="2362293"/>
-                <a:ext cx="455298" cy="238459"/>
-              </a:xfrm>
-              <a:prstGeom prst="rect">
-                <a:avLst/>
-              </a:prstGeom>
-              <a:noFill/>
-            </p:spPr>
-            <p:txBody>
-              <a:bodyPr wrap="square" rtlCol="0">
-                <a:spAutoFit/>
-              </a:bodyPr>
-              <a:lstStyle/>
-              <a:p>
-                <a:r>
-                  <a:rPr lang="en-US" sz="864" dirty="0">
-                    <a:latin typeface="Helvetica Neue" panose="02000503000000020004" pitchFamily="2" charset="0"/>
-                    <a:ea typeface="Helvetica Neue" panose="02000503000000020004" pitchFamily="2" charset="0"/>
-                    <a:cs typeface="Helvetica Neue" panose="02000503000000020004" pitchFamily="2" charset="0"/>
-                  </a:rPr>
-                  <a:t> 1</a:t>
-                </a:r>
-              </a:p>
-            </p:txBody>
-          </p:sp>
-          <p:sp>
-            <p:nvSpPr>
-              <p:cNvPr id="33" name="TextBox 32">
-                <a:extLst>
-                  <a:ext uri="{FF2B5EF4-FFF2-40B4-BE49-F238E27FC236}">
-                    <a16:creationId xmlns:a16="http://schemas.microsoft.com/office/drawing/2014/main" id="{9778C553-ED75-8309-4B30-A45F8D907C47}"/>
-                  </a:ext>
-                </a:extLst>
-              </p:cNvPr>
-              <p:cNvSpPr txBox="1"/>
-              <p:nvPr/>
-            </p:nvSpPr>
-            <p:spPr>
-              <a:xfrm>
-                <a:off x="8663990" y="2814394"/>
-                <a:ext cx="270996" cy="238459"/>
-              </a:xfrm>
-              <a:prstGeom prst="rect">
-                <a:avLst/>
-              </a:prstGeom>
-              <a:noFill/>
-            </p:spPr>
-            <p:txBody>
-              <a:bodyPr wrap="square" rtlCol="0">
-                <a:spAutoFit/>
-              </a:bodyPr>
-              <a:lstStyle/>
-              <a:p>
-                <a:r>
-                  <a:rPr lang="en-US" sz="864" dirty="0">
-                    <a:latin typeface="Helvetica Neue" panose="02000503000000020004" pitchFamily="2" charset="0"/>
-                    <a:ea typeface="Helvetica Neue" panose="02000503000000020004" pitchFamily="2" charset="0"/>
-                    <a:cs typeface="Helvetica Neue" panose="02000503000000020004" pitchFamily="2" charset="0"/>
-                  </a:rPr>
-                  <a:t>2</a:t>
-                </a:r>
-              </a:p>
-            </p:txBody>
-          </p:sp>
-          <p:sp>
-            <p:nvSpPr>
-              <p:cNvPr id="34" name="TextBox 33">
-                <a:extLst>
-                  <a:ext uri="{FF2B5EF4-FFF2-40B4-BE49-F238E27FC236}">
-                    <a16:creationId xmlns:a16="http://schemas.microsoft.com/office/drawing/2014/main" id="{EFF1030F-42A1-A32E-480B-822EE674BFA1}"/>
-                  </a:ext>
-                </a:extLst>
-              </p:cNvPr>
-              <p:cNvSpPr txBox="1"/>
-              <p:nvPr/>
-            </p:nvSpPr>
-            <p:spPr>
-              <a:xfrm>
-                <a:off x="9119690" y="3285419"/>
-                <a:ext cx="270996" cy="238459"/>
-              </a:xfrm>
-              <a:prstGeom prst="rect">
-                <a:avLst/>
-              </a:prstGeom>
-              <a:noFill/>
-            </p:spPr>
-            <p:txBody>
-              <a:bodyPr wrap="square" rtlCol="0">
-                <a:spAutoFit/>
-              </a:bodyPr>
-              <a:lstStyle/>
-              <a:p>
-                <a:r>
-                  <a:rPr lang="en-US" sz="864" dirty="0">
-                    <a:latin typeface="Helvetica Neue" panose="02000503000000020004" pitchFamily="2" charset="0"/>
-                    <a:ea typeface="Helvetica Neue" panose="02000503000000020004" pitchFamily="2" charset="0"/>
-                    <a:cs typeface="Helvetica Neue" panose="02000503000000020004" pitchFamily="2" charset="0"/>
-                  </a:rPr>
-                  <a:t>3</a:t>
-                </a:r>
-              </a:p>
-            </p:txBody>
-          </p:sp>
-          <p:sp>
-            <p:nvSpPr>
-              <p:cNvPr id="35" name="TextBox 34">
-                <a:extLst>
-                  <a:ext uri="{FF2B5EF4-FFF2-40B4-BE49-F238E27FC236}">
-                    <a16:creationId xmlns:a16="http://schemas.microsoft.com/office/drawing/2014/main" id="{829091B7-FE9C-C15F-F7A1-C903066BD02A}"/>
-                  </a:ext>
-                </a:extLst>
-              </p:cNvPr>
-              <p:cNvSpPr txBox="1"/>
-              <p:nvPr/>
-            </p:nvSpPr>
-            <p:spPr>
-              <a:xfrm>
-                <a:off x="9575383" y="3770895"/>
-                <a:ext cx="270996" cy="238459"/>
-              </a:xfrm>
-              <a:prstGeom prst="rect">
-                <a:avLst/>
-              </a:prstGeom>
-              <a:noFill/>
-            </p:spPr>
-            <p:txBody>
-              <a:bodyPr wrap="square" rtlCol="0">
-                <a:spAutoFit/>
-              </a:bodyPr>
-              <a:lstStyle/>
-              <a:p>
-                <a:r>
-                  <a:rPr lang="en-US" sz="864" dirty="0">
-                    <a:latin typeface="Helvetica Neue" panose="02000503000000020004" pitchFamily="2" charset="0"/>
-                    <a:ea typeface="Helvetica Neue" panose="02000503000000020004" pitchFamily="2" charset="0"/>
-                    <a:cs typeface="Helvetica Neue" panose="02000503000000020004" pitchFamily="2" charset="0"/>
-                  </a:rPr>
-                  <a:t>4</a:t>
-                </a:r>
-              </a:p>
-            </p:txBody>
-          </p:sp>
-          <p:sp>
-            <p:nvSpPr>
-              <p:cNvPr id="36" name="TextBox 35">
-                <a:extLst>
-                  <a:ext uri="{FF2B5EF4-FFF2-40B4-BE49-F238E27FC236}">
-                    <a16:creationId xmlns:a16="http://schemas.microsoft.com/office/drawing/2014/main" id="{6CF20445-2583-22FE-5A20-65B7E5FA2E07}"/>
-                  </a:ext>
-                </a:extLst>
-              </p:cNvPr>
-              <p:cNvSpPr txBox="1"/>
-              <p:nvPr/>
-            </p:nvSpPr>
-            <p:spPr>
-              <a:xfrm>
-                <a:off x="10076775" y="4222671"/>
-                <a:ext cx="270996" cy="238459"/>
-              </a:xfrm>
-              <a:prstGeom prst="rect">
-                <a:avLst/>
-              </a:prstGeom>
-              <a:noFill/>
-            </p:spPr>
-            <p:txBody>
-              <a:bodyPr wrap="square" rtlCol="0">
-                <a:spAutoFit/>
-              </a:bodyPr>
-              <a:lstStyle/>
-              <a:p>
-                <a:r>
-                  <a:rPr lang="en-US" sz="864" dirty="0">
-                    <a:latin typeface="Helvetica Neue" panose="02000503000000020004" pitchFamily="2" charset="0"/>
-                    <a:ea typeface="Helvetica Neue" panose="02000503000000020004" pitchFamily="2" charset="0"/>
-                    <a:cs typeface="Helvetica Neue" panose="02000503000000020004" pitchFamily="2" charset="0"/>
-                  </a:rPr>
-                  <a:t>5</a:t>
-                </a:r>
-              </a:p>
-            </p:txBody>
-          </p:sp>
-          <p:sp>
-            <p:nvSpPr>
-              <p:cNvPr id="37" name="TextBox 36">
-                <a:extLst>
-                  <a:ext uri="{FF2B5EF4-FFF2-40B4-BE49-F238E27FC236}">
-                    <a16:creationId xmlns:a16="http://schemas.microsoft.com/office/drawing/2014/main" id="{72CCD715-F259-A0D4-861D-67510EAA8F3A}"/>
-                  </a:ext>
-                </a:extLst>
-              </p:cNvPr>
-              <p:cNvSpPr txBox="1"/>
-              <p:nvPr/>
-            </p:nvSpPr>
-            <p:spPr>
-              <a:xfrm>
-                <a:off x="10532916" y="4681326"/>
-                <a:ext cx="270996" cy="238459"/>
-              </a:xfrm>
-              <a:prstGeom prst="rect">
-                <a:avLst/>
-              </a:prstGeom>
-              <a:noFill/>
-            </p:spPr>
-            <p:txBody>
-              <a:bodyPr wrap="square" rtlCol="0">
-                <a:spAutoFit/>
-              </a:bodyPr>
-              <a:lstStyle/>
-              <a:p>
-                <a:r>
-                  <a:rPr lang="en-US" sz="864" dirty="0">
-                    <a:latin typeface="Helvetica Neue" panose="02000503000000020004" pitchFamily="2" charset="0"/>
-                    <a:ea typeface="Helvetica Neue" panose="02000503000000020004" pitchFamily="2" charset="0"/>
-                    <a:cs typeface="Helvetica Neue" panose="02000503000000020004" pitchFamily="2" charset="0"/>
-                  </a:rPr>
-                  <a:t>6</a:t>
-                </a:r>
-              </a:p>
-            </p:txBody>
-          </p:sp>
-          <p:sp>
-            <p:nvSpPr>
-              <p:cNvPr id="38" name="TextBox 37">
-                <a:extLst>
-                  <a:ext uri="{FF2B5EF4-FFF2-40B4-BE49-F238E27FC236}">
-                    <a16:creationId xmlns:a16="http://schemas.microsoft.com/office/drawing/2014/main" id="{A0E99E31-F0DC-8F0C-FAF2-6A6C5EA8D212}"/>
-                  </a:ext>
-                </a:extLst>
-              </p:cNvPr>
-              <p:cNvSpPr txBox="1"/>
-              <p:nvPr/>
-            </p:nvSpPr>
-            <p:spPr>
-              <a:xfrm>
-                <a:off x="10989059" y="5156106"/>
-                <a:ext cx="270996" cy="238459"/>
-              </a:xfrm>
-              <a:prstGeom prst="rect">
-                <a:avLst/>
-              </a:prstGeom>
-              <a:noFill/>
-            </p:spPr>
-            <p:txBody>
-              <a:bodyPr wrap="square" rtlCol="0">
-                <a:spAutoFit/>
-              </a:bodyPr>
-              <a:lstStyle/>
-              <a:p>
-                <a:r>
-                  <a:rPr lang="en-US" sz="864" dirty="0">
-                    <a:latin typeface="Helvetica Neue" panose="02000503000000020004" pitchFamily="2" charset="0"/>
-                    <a:ea typeface="Helvetica Neue" panose="02000503000000020004" pitchFamily="2" charset="0"/>
-                    <a:cs typeface="Helvetica Neue" panose="02000503000000020004" pitchFamily="2" charset="0"/>
-                  </a:rPr>
-                  <a:t>7</a:t>
-                </a:r>
-              </a:p>
-            </p:txBody>
-          </p:sp>
-          <mc:AlternateContent xmlns:mc="http://schemas.openxmlformats.org/markup-compatibility/2006">
-            <mc:Choice xmlns:a14="http://schemas.microsoft.com/office/drawing/2010/main" Requires="a14">
-              <p:sp>
-                <p:nvSpPr>
-                  <p:cNvPr id="40" name="TextBox 39">
-                    <a:extLst>
-                      <a:ext uri="{FF2B5EF4-FFF2-40B4-BE49-F238E27FC236}">
-                        <a16:creationId xmlns:a16="http://schemas.microsoft.com/office/drawing/2014/main" id="{D7E81313-0A71-DC97-9B95-499C02F7BC0F}"/>
-                      </a:ext>
-                    </a:extLst>
-                  </p:cNvPr>
-                  <p:cNvSpPr txBox="1"/>
-                  <p:nvPr/>
-                </p:nvSpPr>
-                <p:spPr>
-                  <a:xfrm>
-                    <a:off x="8784837" y="5653250"/>
-                    <a:ext cx="2123087" cy="333396"/>
-                  </a:xfrm>
-                  <a:prstGeom prst="rect">
-                    <a:avLst/>
-                  </a:prstGeom>
-                  <a:noFill/>
-                </p:spPr>
-                <p:txBody>
-                  <a:bodyPr wrap="none" rtlCol="0">
-                    <a:spAutoFit/>
-                  </a:bodyPr>
-                  <a:lstStyle/>
-                  <a:p>
-                    <a:r>
-                      <a:rPr lang="en-US" sz="1400" dirty="0">
-                        <a:latin typeface="Helvetica Neue" panose="02000503000000020004" pitchFamily="2" charset="0"/>
-                        <a:ea typeface="Helvetica Neue" panose="02000503000000020004" pitchFamily="2" charset="0"/>
-                        <a:cs typeface="Helvetica Neue" panose="02000503000000020004" pitchFamily="2" charset="0"/>
-                      </a:rPr>
-                      <a:t>(c) </a:t>
-                    </a:r>
-                    <a14:m>
-                      <m:oMath xmlns:m="http://schemas.openxmlformats.org/officeDocument/2006/math">
-                        <m:acc>
-                          <m:accPr>
-                            <m:chr m:val="̂"/>
-                            <m:ctrlPr>
-                              <a:rPr lang="en-US" sz="1400" b="0" i="1" smtClean="0">
-                                <a:latin typeface="Helvetica Neue" panose="02000503000000020004" pitchFamily="2" charset="0"/>
-                                <a:ea typeface="Helvetica Neue" panose="02000503000000020004" pitchFamily="2" charset="0"/>
-                                <a:cs typeface="Helvetica Neue" panose="02000503000000020004" pitchFamily="2" charset="0"/>
-                              </a:rPr>
-                            </m:ctrlPr>
-                          </m:accPr>
-                          <m:e>
-                            <m:r>
-                              <a:rPr lang="en-US" sz="1400" b="0" i="1" smtClean="0">
-                                <a:latin typeface="Cambria Math" panose="02040503050406030204" pitchFamily="18" charset="0"/>
-                                <a:ea typeface="Helvetica Neue" panose="02000503000000020004" pitchFamily="2" charset="0"/>
-                                <a:cs typeface="Helvetica Neue" panose="02000503000000020004" pitchFamily="2" charset="0"/>
-                              </a:rPr>
-                              <m:t>𝑄</m:t>
-                            </m:r>
-                          </m:e>
-                        </m:acc>
-                      </m:oMath>
-                    </a14:m>
-                    <a:r>
-                      <a:rPr lang="en-US" sz="1400" b="0" dirty="0">
-                        <a:latin typeface="Helvetica Neue" panose="02000503000000020004" pitchFamily="2" charset="0"/>
-                        <a:ea typeface="Helvetica Neue" panose="02000503000000020004" pitchFamily="2" charset="0"/>
-                        <a:cs typeface="Helvetica Neue" panose="02000503000000020004" pitchFamily="2" charset="0"/>
-                      </a:rPr>
-                      <a:t> covariance matrix </a:t>
-                    </a:r>
-                  </a:p>
-                </p:txBody>
-              </p:sp>
-            </mc:Choice>
-            <mc:Fallback>
-              <p:sp>
-                <p:nvSpPr>
-                  <p:cNvPr id="40" name="TextBox 39">
-                    <a:extLst>
-                      <a:ext uri="{FF2B5EF4-FFF2-40B4-BE49-F238E27FC236}">
-                        <a16:creationId xmlns:a16="http://schemas.microsoft.com/office/drawing/2014/main" id="{D7E81313-0A71-DC97-9B95-499C02F7BC0F}"/>
-                      </a:ext>
-                    </a:extLst>
-                  </p:cNvPr>
-                  <p:cNvSpPr txBox="1">
-                    <a:spLocks noRot="1" noChangeAspect="1" noMove="1" noResize="1" noEditPoints="1" noAdjustHandles="1" noChangeArrowheads="1" noChangeShapeType="1" noTextEdit="1"/>
-                  </p:cNvSpPr>
-                  <p:nvPr/>
-                </p:nvSpPr>
-                <p:spPr>
-                  <a:xfrm>
-                    <a:off x="8784837" y="5653250"/>
-                    <a:ext cx="2123087" cy="333396"/>
-                  </a:xfrm>
-                  <a:prstGeom prst="rect">
-                    <a:avLst/>
-                  </a:prstGeom>
-                  <a:blipFill>
-                    <a:blip r:embed="rId6"/>
-                    <a:stretch>
-                      <a:fillRect l="-610" t="-3846" b="-19231"/>
-                    </a:stretch>
-                  </a:blipFill>
-                </p:spPr>
-                <p:txBody>
-                  <a:bodyPr/>
-                  <a:lstStyle/>
-                  <a:p>
-                    <a:r>
-                      <a:rPr lang="en-US">
-                        <a:noFill/>
-                      </a:rPr>
-                      <a:t> </a:t>
-                    </a:r>
-                  </a:p>
-                </p:txBody>
-              </p:sp>
-            </mc:Fallback>
-          </mc:AlternateContent>
-        </p:grpSp>
+        <mc:AlternateContent xmlns:mc="http://schemas.openxmlformats.org/markup-compatibility/2006">
+          <mc:Choice xmlns:a14="http://schemas.microsoft.com/office/drawing/2010/main" Requires="a14">
+            <p:sp>
+              <p:nvSpPr>
+                <p:cNvPr id="40" name="TextBox 39">
+                  <a:extLst>
+                    <a:ext uri="{FF2B5EF4-FFF2-40B4-BE49-F238E27FC236}">
+                      <a16:creationId xmlns:a16="http://schemas.microsoft.com/office/drawing/2014/main" id="{D7E81313-0A71-DC97-9B95-499C02F7BC0F}"/>
+                    </a:ext>
+                  </a:extLst>
+                </p:cNvPr>
+                <p:cNvSpPr txBox="1"/>
+                <p:nvPr/>
+              </p:nvSpPr>
+              <p:spPr>
+                <a:xfrm>
+                  <a:off x="8084117" y="4575426"/>
+                  <a:ext cx="2980084" cy="425530"/>
+                </a:xfrm>
+                <a:prstGeom prst="rect">
+                  <a:avLst/>
+                </a:prstGeom>
+                <a:noFill/>
+              </p:spPr>
+              <p:txBody>
+                <a:bodyPr wrap="none" rtlCol="0">
+                  <a:spAutoFit/>
+                </a:bodyPr>
+                <a:lstStyle/>
+                <a:p>
+                  <a:r>
+                    <a:rPr lang="en-US" dirty="0">
+                      <a:latin typeface="Helvetica Neue" panose="02000503000000020004" pitchFamily="2" charset="0"/>
+                      <a:ea typeface="Helvetica Neue" panose="02000503000000020004" pitchFamily="2" charset="0"/>
+                      <a:cs typeface="Helvetica Neue" panose="02000503000000020004" pitchFamily="2" charset="0"/>
+                    </a:rPr>
+                    <a:t>(c) </a:t>
+                  </a:r>
+                  <a14:m>
+                    <m:oMath xmlns:m="http://schemas.openxmlformats.org/officeDocument/2006/math">
+                      <m:acc>
+                        <m:accPr>
+                          <m:chr m:val="̂"/>
+                          <m:ctrlPr>
+                            <a:rPr lang="en-US" b="0" i="1" smtClean="0">
+                              <a:latin typeface="Helvetica Neue" panose="02000503000000020004" pitchFamily="2" charset="0"/>
+                              <a:ea typeface="Helvetica Neue" panose="02000503000000020004" pitchFamily="2" charset="0"/>
+                              <a:cs typeface="Helvetica Neue" panose="02000503000000020004" pitchFamily="2" charset="0"/>
+                            </a:rPr>
+                          </m:ctrlPr>
+                        </m:accPr>
+                        <m:e>
+                          <m:r>
+                            <a:rPr lang="en-US" b="0" i="1" smtClean="0">
+                              <a:latin typeface="Cambria Math" panose="02040503050406030204" pitchFamily="18" charset="0"/>
+                              <a:ea typeface="Helvetica Neue" panose="02000503000000020004" pitchFamily="2" charset="0"/>
+                              <a:cs typeface="Helvetica Neue" panose="02000503000000020004" pitchFamily="2" charset="0"/>
+                            </a:rPr>
+                            <m:t>𝑄</m:t>
+                          </m:r>
+                        </m:e>
+                      </m:acc>
+                    </m:oMath>
+                  </a14:m>
+                  <a:r>
+                    <a:rPr lang="en-US" b="0" dirty="0">
+                      <a:latin typeface="Helvetica Neue" panose="02000503000000020004" pitchFamily="2" charset="0"/>
+                      <a:ea typeface="Helvetica Neue" panose="02000503000000020004" pitchFamily="2" charset="0"/>
+                      <a:cs typeface="Helvetica Neue" panose="02000503000000020004" pitchFamily="2" charset="0"/>
+                    </a:rPr>
+                    <a:t> covariance matrix </a:t>
+                  </a:r>
+                </a:p>
+              </p:txBody>
+            </p:sp>
+          </mc:Choice>
+          <mc:Fallback>
+            <p:sp>
+              <p:nvSpPr>
+                <p:cNvPr id="40" name="TextBox 39">
+                  <a:extLst>
+                    <a:ext uri="{FF2B5EF4-FFF2-40B4-BE49-F238E27FC236}">
+                      <a16:creationId xmlns:a16="http://schemas.microsoft.com/office/drawing/2014/main" id="{D7E81313-0A71-DC97-9B95-499C02F7BC0F}"/>
+                    </a:ext>
+                  </a:extLst>
+                </p:cNvPr>
+                <p:cNvSpPr txBox="1">
+                  <a:spLocks noRot="1" noChangeAspect="1" noMove="1" noResize="1" noEditPoints="1" noAdjustHandles="1" noChangeArrowheads="1" noChangeShapeType="1" noTextEdit="1"/>
+                </p:cNvSpPr>
+                <p:nvPr/>
+              </p:nvSpPr>
+              <p:spPr>
+                <a:xfrm>
+                  <a:off x="8084117" y="4575426"/>
+                  <a:ext cx="2980084" cy="425530"/>
+                </a:xfrm>
+                <a:prstGeom prst="rect">
+                  <a:avLst/>
+                </a:prstGeom>
+                <a:blipFill>
+                  <a:blip r:embed="rId6"/>
+                  <a:stretch>
+                    <a:fillRect l="-1942" t="-6452" r="-971" b="-22581"/>
+                  </a:stretch>
+                </a:blipFill>
+              </p:spPr>
+              <p:txBody>
+                <a:bodyPr/>
+                <a:lstStyle/>
+                <a:p>
+                  <a:r>
+                    <a:rPr lang="en-US">
+                      <a:noFill/>
+                    </a:rPr>
+                    <a:t> </a:t>
+                  </a:r>
+                </a:p>
+              </p:txBody>
+            </p:sp>
+          </mc:Fallback>
+        </mc:AlternateContent>
       </p:grpSp>
+      <p:sp>
+        <p:nvSpPr>
+          <p:cNvPr id="6" name="TextBox 5">
+            <a:extLst>
+              <a:ext uri="{FF2B5EF4-FFF2-40B4-BE49-F238E27FC236}">
+                <a16:creationId xmlns:a16="http://schemas.microsoft.com/office/drawing/2014/main" id="{66464189-B5B0-AD3D-086E-DDBB368C4C52}"/>
+              </a:ext>
+            </a:extLst>
+          </p:cNvPr>
+          <p:cNvSpPr txBox="1"/>
+          <p:nvPr/>
+        </p:nvSpPr>
+        <p:spPr>
+          <a:xfrm>
+            <a:off x="5486400" y="4031994"/>
+            <a:ext cx="184731" cy="369332"/>
+          </a:xfrm>
+          <a:prstGeom prst="rect">
+            <a:avLst/>
+          </a:prstGeom>
+          <a:noFill/>
+        </p:spPr>
+        <p:txBody>
+          <a:bodyPr wrap="none" rtlCol="0">
+            <a:spAutoFit/>
+          </a:bodyPr>
+          <a:lstStyle/>
+          <a:p>
+            <a:endParaRPr lang="en-US" dirty="0"/>
+          </a:p>
+        </p:txBody>
+      </p:sp>
       <p:grpSp>
         <p:nvGrpSpPr>
-          <p:cNvPr id="62" name="Group 61">
+          <p:cNvPr id="29" name="Group 28">
             <a:extLst>
               <a:ext uri="{FF2B5EF4-FFF2-40B4-BE49-F238E27FC236}">
-                <a16:creationId xmlns:a16="http://schemas.microsoft.com/office/drawing/2014/main" id="{1C9C5DC3-32E3-132A-44AC-61A08287C746}"/>
+                <a16:creationId xmlns:a16="http://schemas.microsoft.com/office/drawing/2014/main" id="{90D90CAC-2941-EC1B-3F9D-9EF72622F47B}"/>
               </a:ext>
             </a:extLst>
           </p:cNvPr>
@@ -4361,18 +3824,18 @@
         </p:nvGrpSpPr>
         <p:grpSpPr>
           <a:xfrm>
-            <a:off x="4355393" y="1073963"/>
-            <a:ext cx="3419456" cy="3224346"/>
-            <a:chOff x="4386277" y="1565283"/>
-            <a:chExt cx="3419455" cy="3224346"/>
+            <a:off x="223675" y="189672"/>
+            <a:ext cx="4100492" cy="4100492"/>
+            <a:chOff x="4191544" y="219557"/>
+            <a:chExt cx="4100492" cy="4100492"/>
           </a:xfrm>
         </p:grpSpPr>
         <p:pic>
           <p:nvPicPr>
-            <p:cNvPr id="9" name="Picture 8" descr="A structure of a molecule&#10;&#10;Description automatically generated">
+            <p:cNvPr id="3" name="Picture 2" descr="A graph of a number of squares&#10;&#10;Description automatically generated with medium confidence">
               <a:extLst>
                 <a:ext uri="{FF2B5EF4-FFF2-40B4-BE49-F238E27FC236}">
-                  <a16:creationId xmlns:a16="http://schemas.microsoft.com/office/drawing/2014/main" id="{93189DB0-F442-0FC9-A8E3-9278EAE00A3E}"/>
+                  <a16:creationId xmlns:a16="http://schemas.microsoft.com/office/drawing/2014/main" id="{78C96359-CE48-B5F6-94AC-7DAC88AF95E9}"/>
                 </a:ext>
               </a:extLst>
             </p:cNvPr>
@@ -4389,725 +3852,156 @@
           </p:blipFill>
           <p:spPr>
             <a:xfrm>
-              <a:off x="4386277" y="1565283"/>
-              <a:ext cx="3419455" cy="2455833"/>
+              <a:off x="4191544" y="219557"/>
+              <a:ext cx="4100492" cy="4100492"/>
             </a:xfrm>
             <a:prstGeom prst="rect">
               <a:avLst/>
             </a:prstGeom>
           </p:spPr>
         </p:pic>
-        <p:grpSp>
-          <p:nvGrpSpPr>
-            <p:cNvPr id="44" name="Group 43">
-              <a:extLst>
-                <a:ext uri="{FF2B5EF4-FFF2-40B4-BE49-F238E27FC236}">
-                  <a16:creationId xmlns:a16="http://schemas.microsoft.com/office/drawing/2014/main" id="{C412F44F-30E3-CE4D-AB70-5AE48246FD8F}"/>
-                </a:ext>
-              </a:extLst>
-            </p:cNvPr>
-            <p:cNvGrpSpPr/>
-            <p:nvPr/>
-          </p:nvGrpSpPr>
-          <p:grpSpPr>
-            <a:xfrm>
-              <a:off x="5036402" y="1889402"/>
-              <a:ext cx="2087431" cy="2900227"/>
-              <a:chOff x="5036402" y="3032401"/>
-              <a:chExt cx="2087431" cy="2900227"/>
-            </a:xfrm>
-          </p:grpSpPr>
-          <p:sp>
-            <p:nvSpPr>
-              <p:cNvPr id="10" name="Connector 9">
-                <a:extLst>
-                  <a:ext uri="{FF2B5EF4-FFF2-40B4-BE49-F238E27FC236}">
-                    <a16:creationId xmlns:a16="http://schemas.microsoft.com/office/drawing/2014/main" id="{E49D3897-EA03-8447-257A-D21C8D8B6AB9}"/>
-                  </a:ext>
-                </a:extLst>
-              </p:cNvPr>
-              <p:cNvSpPr/>
-              <p:nvPr/>
-            </p:nvSpPr>
-            <p:spPr>
-              <a:xfrm>
-                <a:off x="5277187" y="3375524"/>
-                <a:ext cx="457200" cy="457200"/>
-              </a:xfrm>
-              <a:prstGeom prst="flowChartConnector">
-                <a:avLst/>
-              </a:prstGeom>
-              <a:noFill/>
-              <a:effectLst>
-                <a:glow rad="88081">
-                  <a:schemeClr val="accent1">
-                    <a:alpha val="55000"/>
-                  </a:schemeClr>
-                </a:glow>
-              </a:effectLst>
-            </p:spPr>
-            <p:style>
-              <a:lnRef idx="2">
-                <a:schemeClr val="accent1">
-                  <a:shade val="15000"/>
-                </a:schemeClr>
-              </a:lnRef>
-              <a:fillRef idx="1">
-                <a:schemeClr val="accent1"/>
-              </a:fillRef>
-              <a:effectRef idx="0">
-                <a:schemeClr val="accent1"/>
-              </a:effectRef>
-              <a:fontRef idx="minor">
-                <a:schemeClr val="lt1"/>
-              </a:fontRef>
-            </p:style>
-            <p:txBody>
-              <a:bodyPr rtlCol="0" anchor="ctr"/>
-              <a:lstStyle/>
-              <a:p>
-                <a:pPr algn="ctr"/>
-                <a:endParaRPr lang="en-US" sz="864" dirty="0"/>
-              </a:p>
-            </p:txBody>
-          </p:sp>
-          <p:sp>
-            <p:nvSpPr>
-              <p:cNvPr id="11" name="Connector 10">
-                <a:extLst>
-                  <a:ext uri="{FF2B5EF4-FFF2-40B4-BE49-F238E27FC236}">
-                    <a16:creationId xmlns:a16="http://schemas.microsoft.com/office/drawing/2014/main" id="{B62CF546-1750-B569-0ED0-211B81B0ED50}"/>
-                  </a:ext>
-                </a:extLst>
-              </p:cNvPr>
-              <p:cNvSpPr/>
-              <p:nvPr/>
-            </p:nvSpPr>
-            <p:spPr>
-              <a:xfrm>
-                <a:off x="5867399" y="3707594"/>
-                <a:ext cx="457200" cy="457200"/>
-              </a:xfrm>
-              <a:prstGeom prst="flowChartConnector">
-                <a:avLst/>
-              </a:prstGeom>
-              <a:noFill/>
-              <a:effectLst>
-                <a:glow rad="88081">
-                  <a:schemeClr val="accent1">
-                    <a:alpha val="55000"/>
-                  </a:schemeClr>
-                </a:glow>
-              </a:effectLst>
-            </p:spPr>
-            <p:style>
-              <a:lnRef idx="2">
-                <a:schemeClr val="accent1">
-                  <a:shade val="15000"/>
-                </a:schemeClr>
-              </a:lnRef>
-              <a:fillRef idx="1">
-                <a:schemeClr val="accent1"/>
-              </a:fillRef>
-              <a:effectRef idx="0">
-                <a:schemeClr val="accent1"/>
-              </a:effectRef>
-              <a:fontRef idx="minor">
-                <a:schemeClr val="lt1"/>
-              </a:fontRef>
-            </p:style>
-            <p:txBody>
-              <a:bodyPr rtlCol="0" anchor="ctr"/>
-              <a:lstStyle/>
-              <a:p>
-                <a:pPr algn="ctr"/>
-                <a:endParaRPr lang="en-US" sz="864" dirty="0"/>
-              </a:p>
-            </p:txBody>
-          </p:sp>
-          <p:sp>
-            <p:nvSpPr>
-              <p:cNvPr id="12" name="Connector 11">
-                <a:extLst>
-                  <a:ext uri="{FF2B5EF4-FFF2-40B4-BE49-F238E27FC236}">
-                    <a16:creationId xmlns:a16="http://schemas.microsoft.com/office/drawing/2014/main" id="{A521742A-156E-E266-A9ED-D92CD30F6DB6}"/>
-                  </a:ext>
-                </a:extLst>
-              </p:cNvPr>
-              <p:cNvSpPr/>
-              <p:nvPr/>
-            </p:nvSpPr>
-            <p:spPr>
-              <a:xfrm>
-                <a:off x="5867399" y="3032401"/>
-                <a:ext cx="457200" cy="457200"/>
-              </a:xfrm>
-              <a:prstGeom prst="flowChartConnector">
-                <a:avLst/>
-              </a:prstGeom>
-              <a:noFill/>
-              <a:effectLst>
-                <a:glow rad="88081">
-                  <a:schemeClr val="accent1">
-                    <a:alpha val="55000"/>
-                  </a:schemeClr>
-                </a:glow>
-              </a:effectLst>
-            </p:spPr>
-            <p:style>
-              <a:lnRef idx="2">
-                <a:schemeClr val="accent1">
-                  <a:shade val="15000"/>
-                </a:schemeClr>
-              </a:lnRef>
-              <a:fillRef idx="1">
-                <a:schemeClr val="accent1"/>
-              </a:fillRef>
-              <a:effectRef idx="0">
-                <a:schemeClr val="accent1"/>
-              </a:effectRef>
-              <a:fontRef idx="minor">
-                <a:schemeClr val="lt1"/>
-              </a:fontRef>
-            </p:style>
-            <p:txBody>
-              <a:bodyPr rtlCol="0" anchor="ctr"/>
-              <a:lstStyle/>
-              <a:p>
-                <a:pPr algn="ctr"/>
-                <a:endParaRPr lang="en-US" sz="864" dirty="0"/>
-              </a:p>
-            </p:txBody>
-          </p:sp>
-          <p:sp>
-            <p:nvSpPr>
-              <p:cNvPr id="13" name="Connector 12">
-                <a:extLst>
-                  <a:ext uri="{FF2B5EF4-FFF2-40B4-BE49-F238E27FC236}">
-                    <a16:creationId xmlns:a16="http://schemas.microsoft.com/office/drawing/2014/main" id="{4F799FF3-B15A-2BA2-EB1A-2D8F252C2891}"/>
-                  </a:ext>
-                </a:extLst>
-              </p:cNvPr>
-              <p:cNvSpPr/>
-              <p:nvPr/>
-            </p:nvSpPr>
-            <p:spPr>
-              <a:xfrm>
-                <a:off x="6457611" y="3375524"/>
-                <a:ext cx="457200" cy="457200"/>
-              </a:xfrm>
-              <a:prstGeom prst="flowChartConnector">
-                <a:avLst/>
-              </a:prstGeom>
-              <a:noFill/>
-              <a:effectLst>
-                <a:glow rad="88081">
-                  <a:schemeClr val="accent1">
-                    <a:alpha val="55000"/>
-                  </a:schemeClr>
-                </a:glow>
-              </a:effectLst>
-            </p:spPr>
-            <p:style>
-              <a:lnRef idx="2">
-                <a:schemeClr val="accent1">
-                  <a:shade val="15000"/>
-                </a:schemeClr>
-              </a:lnRef>
-              <a:fillRef idx="1">
-                <a:schemeClr val="accent1"/>
-              </a:fillRef>
-              <a:effectRef idx="0">
-                <a:schemeClr val="accent1"/>
-              </a:effectRef>
-              <a:fontRef idx="minor">
-                <a:schemeClr val="lt1"/>
-              </a:fontRef>
-            </p:style>
-            <p:txBody>
-              <a:bodyPr rtlCol="0" anchor="ctr"/>
-              <a:lstStyle/>
-              <a:p>
-                <a:pPr algn="ctr"/>
-                <a:endParaRPr lang="en-US" sz="864" dirty="0"/>
-              </a:p>
-            </p:txBody>
-          </p:sp>
-          <p:sp>
-            <p:nvSpPr>
-              <p:cNvPr id="14" name="Connector 13">
-                <a:extLst>
-                  <a:ext uri="{FF2B5EF4-FFF2-40B4-BE49-F238E27FC236}">
-                    <a16:creationId xmlns:a16="http://schemas.microsoft.com/office/drawing/2014/main" id="{70082458-D315-4F2B-517B-8612F949EF6D}"/>
-                  </a:ext>
-                </a:extLst>
-              </p:cNvPr>
-              <p:cNvSpPr/>
-              <p:nvPr/>
-            </p:nvSpPr>
-            <p:spPr>
-              <a:xfrm>
-                <a:off x="5277187" y="4041217"/>
-                <a:ext cx="457200" cy="457200"/>
-              </a:xfrm>
-              <a:prstGeom prst="flowChartConnector">
-                <a:avLst/>
-              </a:prstGeom>
-              <a:noFill/>
-              <a:effectLst>
-                <a:glow rad="88081">
-                  <a:schemeClr val="accent1">
-                    <a:alpha val="55000"/>
-                  </a:schemeClr>
-                </a:glow>
-              </a:effectLst>
-            </p:spPr>
-            <p:style>
-              <a:lnRef idx="2">
-                <a:schemeClr val="accent1">
-                  <a:shade val="15000"/>
-                </a:schemeClr>
-              </a:lnRef>
-              <a:fillRef idx="1">
-                <a:schemeClr val="accent1"/>
-              </a:fillRef>
-              <a:effectRef idx="0">
-                <a:schemeClr val="accent1"/>
-              </a:effectRef>
-              <a:fontRef idx="minor">
-                <a:schemeClr val="lt1"/>
-              </a:fontRef>
-            </p:style>
-            <p:txBody>
-              <a:bodyPr rtlCol="0" anchor="ctr"/>
-              <a:lstStyle/>
-              <a:p>
-                <a:pPr algn="ctr"/>
-                <a:endParaRPr lang="en-US" sz="864" dirty="0"/>
-              </a:p>
-            </p:txBody>
-          </p:sp>
-          <p:sp>
-            <p:nvSpPr>
-              <p:cNvPr id="15" name="Connector 14">
-                <a:extLst>
-                  <a:ext uri="{FF2B5EF4-FFF2-40B4-BE49-F238E27FC236}">
-                    <a16:creationId xmlns:a16="http://schemas.microsoft.com/office/drawing/2014/main" id="{09D3872C-0B44-9793-C1A7-4CE66EDDEBFA}"/>
-                  </a:ext>
-                </a:extLst>
-              </p:cNvPr>
-              <p:cNvSpPr/>
-              <p:nvPr/>
-            </p:nvSpPr>
-            <p:spPr>
-              <a:xfrm>
-                <a:off x="5867399" y="4363069"/>
-                <a:ext cx="457200" cy="457200"/>
-              </a:xfrm>
-              <a:prstGeom prst="flowChartConnector">
-                <a:avLst/>
-              </a:prstGeom>
-              <a:noFill/>
-              <a:effectLst>
-                <a:glow rad="88081">
-                  <a:schemeClr val="accent1">
-                    <a:alpha val="55000"/>
-                  </a:schemeClr>
-                </a:glow>
-              </a:effectLst>
-            </p:spPr>
-            <p:style>
-              <a:lnRef idx="2">
-                <a:schemeClr val="accent1">
-                  <a:shade val="15000"/>
-                </a:schemeClr>
-              </a:lnRef>
-              <a:fillRef idx="1">
-                <a:schemeClr val="accent1"/>
-              </a:fillRef>
-              <a:effectRef idx="0">
-                <a:schemeClr val="accent1"/>
-              </a:effectRef>
-              <a:fontRef idx="minor">
-                <a:schemeClr val="lt1"/>
-              </a:fontRef>
-            </p:style>
-            <p:txBody>
-              <a:bodyPr rtlCol="0" anchor="ctr"/>
-              <a:lstStyle/>
-              <a:p>
-                <a:pPr algn="ctr"/>
-                <a:endParaRPr lang="en-US" sz="864" dirty="0"/>
-              </a:p>
-            </p:txBody>
-          </p:sp>
-          <p:sp>
-            <p:nvSpPr>
-              <p:cNvPr id="16" name="Connector 15">
-                <a:extLst>
-                  <a:ext uri="{FF2B5EF4-FFF2-40B4-BE49-F238E27FC236}">
-                    <a16:creationId xmlns:a16="http://schemas.microsoft.com/office/drawing/2014/main" id="{41BAF20F-31D9-935C-EDAD-7D7FB09429E7}"/>
-                  </a:ext>
-                </a:extLst>
-              </p:cNvPr>
-              <p:cNvSpPr/>
-              <p:nvPr/>
-            </p:nvSpPr>
-            <p:spPr>
-              <a:xfrm>
-                <a:off x="6457611" y="4041217"/>
-                <a:ext cx="457200" cy="457200"/>
-              </a:xfrm>
-              <a:prstGeom prst="flowChartConnector">
-                <a:avLst/>
-              </a:prstGeom>
-              <a:noFill/>
-              <a:effectLst>
-                <a:glow rad="88081">
-                  <a:schemeClr val="accent1">
-                    <a:alpha val="55000"/>
-                  </a:schemeClr>
-                </a:glow>
-              </a:effectLst>
-            </p:spPr>
-            <p:style>
-              <a:lnRef idx="2">
-                <a:schemeClr val="accent1">
-                  <a:shade val="15000"/>
-                </a:schemeClr>
-              </a:lnRef>
-              <a:fillRef idx="1">
-                <a:schemeClr val="accent1"/>
-              </a:fillRef>
-              <a:effectRef idx="0">
-                <a:schemeClr val="accent1"/>
-              </a:effectRef>
-              <a:fontRef idx="minor">
-                <a:schemeClr val="lt1"/>
-              </a:fontRef>
-            </p:style>
-            <p:txBody>
-              <a:bodyPr rtlCol="0" anchor="ctr"/>
-              <a:lstStyle/>
-              <a:p>
-                <a:pPr algn="ctr"/>
-                <a:endParaRPr lang="en-US" sz="864" dirty="0"/>
-              </a:p>
-            </p:txBody>
-          </p:sp>
-          <p:sp>
-            <p:nvSpPr>
-              <p:cNvPr id="17" name="TextBox 16">
-                <a:extLst>
-                  <a:ext uri="{FF2B5EF4-FFF2-40B4-BE49-F238E27FC236}">
-                    <a16:creationId xmlns:a16="http://schemas.microsoft.com/office/drawing/2014/main" id="{500DD474-3DB6-939F-F2E0-6139E2481A10}"/>
-                  </a:ext>
-                </a:extLst>
-              </p:cNvPr>
-              <p:cNvSpPr txBox="1"/>
-              <p:nvPr/>
-            </p:nvSpPr>
-            <p:spPr>
-              <a:xfrm>
-                <a:off x="5365724" y="4085150"/>
-                <a:ext cx="270997" cy="225318"/>
-              </a:xfrm>
-              <a:prstGeom prst="rect">
-                <a:avLst/>
-              </a:prstGeom>
-              <a:noFill/>
-            </p:spPr>
-            <p:txBody>
-              <a:bodyPr wrap="square" rtlCol="0">
-                <a:spAutoFit/>
-              </a:bodyPr>
-              <a:lstStyle/>
-              <a:p>
-                <a:r>
-                  <a:rPr lang="en-US" sz="864" dirty="0">
-                    <a:latin typeface="Helvetica Neue" panose="02000503000000020004" pitchFamily="2" charset="0"/>
-                    <a:ea typeface="Helvetica Neue" panose="02000503000000020004" pitchFamily="2" charset="0"/>
-                    <a:cs typeface="Helvetica Neue" panose="02000503000000020004" pitchFamily="2" charset="0"/>
-                  </a:rPr>
-                  <a:t>1</a:t>
-                </a:r>
-              </a:p>
-            </p:txBody>
-          </p:sp>
-          <p:sp>
-            <p:nvSpPr>
-              <p:cNvPr id="18" name="TextBox 17">
-                <a:extLst>
-                  <a:ext uri="{FF2B5EF4-FFF2-40B4-BE49-F238E27FC236}">
-                    <a16:creationId xmlns:a16="http://schemas.microsoft.com/office/drawing/2014/main" id="{3E0A1356-F6AC-4FA6-4A86-83B5EABF7D16}"/>
-                  </a:ext>
-                </a:extLst>
-              </p:cNvPr>
-              <p:cNvSpPr txBox="1"/>
-              <p:nvPr/>
-            </p:nvSpPr>
-            <p:spPr>
-              <a:xfrm>
-                <a:off x="5360898" y="3429001"/>
-                <a:ext cx="270997" cy="225318"/>
-              </a:xfrm>
-              <a:prstGeom prst="rect">
-                <a:avLst/>
-              </a:prstGeom>
-              <a:noFill/>
-            </p:spPr>
-            <p:txBody>
-              <a:bodyPr wrap="square" rtlCol="0">
-                <a:spAutoFit/>
-              </a:bodyPr>
-              <a:lstStyle/>
-              <a:p>
-                <a:r>
-                  <a:rPr lang="en-US" sz="864" dirty="0">
-                    <a:latin typeface="Helvetica Neue" panose="02000503000000020004" pitchFamily="2" charset="0"/>
-                    <a:ea typeface="Helvetica Neue" panose="02000503000000020004" pitchFamily="2" charset="0"/>
-                    <a:cs typeface="Helvetica Neue" panose="02000503000000020004" pitchFamily="2" charset="0"/>
-                  </a:rPr>
-                  <a:t>2</a:t>
-                </a:r>
-              </a:p>
-            </p:txBody>
-          </p:sp>
-          <p:sp>
-            <p:nvSpPr>
-              <p:cNvPr id="19" name="TextBox 18">
-                <a:extLst>
-                  <a:ext uri="{FF2B5EF4-FFF2-40B4-BE49-F238E27FC236}">
-                    <a16:creationId xmlns:a16="http://schemas.microsoft.com/office/drawing/2014/main" id="{1403B683-C227-513D-F256-52FACAE2AFA7}"/>
-                  </a:ext>
-                </a:extLst>
-              </p:cNvPr>
-              <p:cNvSpPr txBox="1"/>
-              <p:nvPr/>
-            </p:nvSpPr>
-            <p:spPr>
-              <a:xfrm>
-                <a:off x="5955938" y="3076334"/>
-                <a:ext cx="270997" cy="225318"/>
-              </a:xfrm>
-              <a:prstGeom prst="rect">
-                <a:avLst/>
-              </a:prstGeom>
-              <a:noFill/>
-            </p:spPr>
-            <p:txBody>
-              <a:bodyPr wrap="square" rtlCol="0">
-                <a:spAutoFit/>
-              </a:bodyPr>
-              <a:lstStyle/>
-              <a:p>
-                <a:r>
-                  <a:rPr lang="en-US" sz="864" dirty="0">
-                    <a:latin typeface="Helvetica Neue" panose="02000503000000020004" pitchFamily="2" charset="0"/>
-                    <a:ea typeface="Helvetica Neue" panose="02000503000000020004" pitchFamily="2" charset="0"/>
-                    <a:cs typeface="Helvetica Neue" panose="02000503000000020004" pitchFamily="2" charset="0"/>
-                  </a:rPr>
-                  <a:t>3</a:t>
-                </a:r>
-              </a:p>
-            </p:txBody>
-          </p:sp>
-          <p:sp>
-            <p:nvSpPr>
-              <p:cNvPr id="20" name="TextBox 19">
-                <a:extLst>
-                  <a:ext uri="{FF2B5EF4-FFF2-40B4-BE49-F238E27FC236}">
-                    <a16:creationId xmlns:a16="http://schemas.microsoft.com/office/drawing/2014/main" id="{E95C43EC-9663-A4E3-BB6A-78B86F07A2C8}"/>
-                  </a:ext>
-                </a:extLst>
-              </p:cNvPr>
-              <p:cNvSpPr txBox="1"/>
-              <p:nvPr/>
-            </p:nvSpPr>
-            <p:spPr>
-              <a:xfrm>
-                <a:off x="6537623" y="3419456"/>
-                <a:ext cx="270997" cy="225318"/>
-              </a:xfrm>
-              <a:prstGeom prst="rect">
-                <a:avLst/>
-              </a:prstGeom>
-              <a:noFill/>
-            </p:spPr>
-            <p:txBody>
-              <a:bodyPr wrap="square" rtlCol="0">
-                <a:spAutoFit/>
-              </a:bodyPr>
-              <a:lstStyle/>
-              <a:p>
-                <a:r>
-                  <a:rPr lang="en-US" sz="864" dirty="0">
-                    <a:latin typeface="Helvetica Neue" panose="02000503000000020004" pitchFamily="2" charset="0"/>
-                    <a:ea typeface="Helvetica Neue" panose="02000503000000020004" pitchFamily="2" charset="0"/>
-                    <a:cs typeface="Helvetica Neue" panose="02000503000000020004" pitchFamily="2" charset="0"/>
-                  </a:rPr>
-                  <a:t>4</a:t>
-                </a:r>
-              </a:p>
-            </p:txBody>
-          </p:sp>
-          <p:sp>
-            <p:nvSpPr>
-              <p:cNvPr id="21" name="TextBox 20">
-                <a:extLst>
-                  <a:ext uri="{FF2B5EF4-FFF2-40B4-BE49-F238E27FC236}">
-                    <a16:creationId xmlns:a16="http://schemas.microsoft.com/office/drawing/2014/main" id="{20163D7D-B6B7-B7A4-6259-0980A83DA52E}"/>
-                  </a:ext>
-                </a:extLst>
-              </p:cNvPr>
-              <p:cNvSpPr txBox="1"/>
-              <p:nvPr/>
-            </p:nvSpPr>
-            <p:spPr>
-              <a:xfrm>
-                <a:off x="6549980" y="4085150"/>
-                <a:ext cx="270997" cy="225318"/>
-              </a:xfrm>
-              <a:prstGeom prst="rect">
-                <a:avLst/>
-              </a:prstGeom>
-              <a:noFill/>
-            </p:spPr>
-            <p:txBody>
-              <a:bodyPr wrap="square" rtlCol="0">
-                <a:spAutoFit/>
-              </a:bodyPr>
-              <a:lstStyle/>
-              <a:p>
-                <a:r>
-                  <a:rPr lang="en-US" sz="864" dirty="0">
-                    <a:latin typeface="Helvetica Neue" panose="02000503000000020004" pitchFamily="2" charset="0"/>
-                    <a:ea typeface="Helvetica Neue" panose="02000503000000020004" pitchFamily="2" charset="0"/>
-                    <a:cs typeface="Helvetica Neue" panose="02000503000000020004" pitchFamily="2" charset="0"/>
-                  </a:rPr>
-                  <a:t>5</a:t>
-                </a:r>
-              </a:p>
-            </p:txBody>
-          </p:sp>
-          <p:sp>
-            <p:nvSpPr>
-              <p:cNvPr id="22" name="TextBox 21">
-                <a:extLst>
-                  <a:ext uri="{FF2B5EF4-FFF2-40B4-BE49-F238E27FC236}">
-                    <a16:creationId xmlns:a16="http://schemas.microsoft.com/office/drawing/2014/main" id="{F8D760C2-8CF6-A48A-F0CB-C81937F30346}"/>
-                  </a:ext>
-                </a:extLst>
-              </p:cNvPr>
-              <p:cNvSpPr txBox="1"/>
-              <p:nvPr/>
-            </p:nvSpPr>
-            <p:spPr>
-              <a:xfrm>
-                <a:off x="5944620" y="4407002"/>
-                <a:ext cx="270997" cy="225318"/>
-              </a:xfrm>
-              <a:prstGeom prst="rect">
-                <a:avLst/>
-              </a:prstGeom>
-              <a:noFill/>
-            </p:spPr>
-            <p:txBody>
-              <a:bodyPr wrap="square" rtlCol="0">
-                <a:spAutoFit/>
-              </a:bodyPr>
-              <a:lstStyle/>
-              <a:p>
-                <a:r>
-                  <a:rPr lang="en-US" sz="864" dirty="0">
-                    <a:latin typeface="Helvetica Neue" panose="02000503000000020004" pitchFamily="2" charset="0"/>
-                    <a:ea typeface="Helvetica Neue" panose="02000503000000020004" pitchFamily="2" charset="0"/>
-                    <a:cs typeface="Helvetica Neue" panose="02000503000000020004" pitchFamily="2" charset="0"/>
-                  </a:rPr>
-                  <a:t>6</a:t>
-                </a:r>
-              </a:p>
-            </p:txBody>
-          </p:sp>
-          <p:sp>
-            <p:nvSpPr>
-              <p:cNvPr id="23" name="TextBox 22">
-                <a:extLst>
-                  <a:ext uri="{FF2B5EF4-FFF2-40B4-BE49-F238E27FC236}">
-                    <a16:creationId xmlns:a16="http://schemas.microsoft.com/office/drawing/2014/main" id="{96B1FCA7-A3C7-8FEF-0BCF-7FCB0A4F5F63}"/>
-                  </a:ext>
-                </a:extLst>
-              </p:cNvPr>
-              <p:cNvSpPr txBox="1"/>
-              <p:nvPr/>
-            </p:nvSpPr>
-            <p:spPr>
-              <a:xfrm>
-                <a:off x="5955938" y="3751526"/>
-                <a:ext cx="270997" cy="225318"/>
-              </a:xfrm>
-              <a:prstGeom prst="rect">
-                <a:avLst/>
-              </a:prstGeom>
-              <a:noFill/>
-            </p:spPr>
-            <p:txBody>
-              <a:bodyPr wrap="square" rtlCol="0">
-                <a:spAutoFit/>
-              </a:bodyPr>
-              <a:lstStyle/>
-              <a:p>
-                <a:r>
-                  <a:rPr lang="en-US" sz="864" dirty="0">
-                    <a:latin typeface="Helvetica Neue" panose="02000503000000020004" pitchFamily="2" charset="0"/>
-                    <a:ea typeface="Helvetica Neue" panose="02000503000000020004" pitchFamily="2" charset="0"/>
-                    <a:cs typeface="Helvetica Neue" panose="02000503000000020004" pitchFamily="2" charset="0"/>
-                  </a:rPr>
-                  <a:t>7</a:t>
-                </a:r>
-              </a:p>
-            </p:txBody>
-          </p:sp>
-          <p:sp>
-            <p:nvSpPr>
-              <p:cNvPr id="41" name="TextBox 40">
-                <a:extLst>
-                  <a:ext uri="{FF2B5EF4-FFF2-40B4-BE49-F238E27FC236}">
-                    <a16:creationId xmlns:a16="http://schemas.microsoft.com/office/drawing/2014/main" id="{807D31C2-1E9C-4F94-1F13-AE79D05D9016}"/>
-                  </a:ext>
-                </a:extLst>
-              </p:cNvPr>
-              <p:cNvSpPr txBox="1"/>
-              <p:nvPr/>
-            </p:nvSpPr>
-            <p:spPr>
-              <a:xfrm>
-                <a:off x="5036402" y="5624851"/>
-                <a:ext cx="2087431" cy="307777"/>
-              </a:xfrm>
-              <a:prstGeom prst="rect">
-                <a:avLst/>
-              </a:prstGeom>
-              <a:noFill/>
-            </p:spPr>
-            <p:txBody>
-              <a:bodyPr wrap="none" rtlCol="0">
-                <a:spAutoFit/>
-              </a:bodyPr>
-              <a:lstStyle/>
-              <a:p>
-                <a:r>
-                  <a:rPr lang="en-US" sz="1400" dirty="0">
-                    <a:latin typeface="Helvetica Neue" panose="02000503000000020004" pitchFamily="2" charset="0"/>
-                    <a:ea typeface="Helvetica Neue" panose="02000503000000020004" pitchFamily="2" charset="0"/>
-                    <a:cs typeface="Helvetica Neue" panose="02000503000000020004" pitchFamily="2" charset="0"/>
-                  </a:rPr>
-                  <a:t>(b) Hexabenzocoronene</a:t>
-                </a:r>
-              </a:p>
-            </p:txBody>
-          </p:sp>
-        </p:grpSp>
+        <mc:AlternateContent xmlns:mc="http://schemas.openxmlformats.org/markup-compatibility/2006">
+          <mc:Choice xmlns:a14="http://schemas.microsoft.com/office/drawing/2010/main" Requires="a14">
+            <p:sp>
+              <p:nvSpPr>
+                <p:cNvPr id="8" name="TextBox 7">
+                  <a:extLst>
+                    <a:ext uri="{FF2B5EF4-FFF2-40B4-BE49-F238E27FC236}">
+                      <a16:creationId xmlns:a16="http://schemas.microsoft.com/office/drawing/2014/main" id="{9D923AA2-8CED-5FA1-992D-66EE911D6892}"/>
+                    </a:ext>
+                  </a:extLst>
+                </p:cNvPr>
+                <p:cNvSpPr txBox="1"/>
+                <p:nvPr/>
+              </p:nvSpPr>
+              <p:spPr>
+                <a:xfrm>
+                  <a:off x="4398227" y="3941291"/>
+                  <a:ext cx="2926314" cy="378758"/>
+                </a:xfrm>
+                <a:prstGeom prst="rect">
+                  <a:avLst/>
+                </a:prstGeom>
+                <a:noFill/>
+              </p:spPr>
+              <p:txBody>
+                <a:bodyPr wrap="none" rtlCol="0">
+                  <a:spAutoFit/>
+                </a:bodyPr>
+                <a:lstStyle/>
+                <a:p>
+                  <a:r>
+                    <a:rPr lang="en-US" b="0" dirty="0">
+                      <a:latin typeface="Helvetica Neue" panose="02000503000000020004" pitchFamily="2" charset="0"/>
+                      <a:ea typeface="Helvetica Neue" panose="02000503000000020004" pitchFamily="2" charset="0"/>
+                      <a:cs typeface="Helvetica Neue" panose="02000503000000020004" pitchFamily="2" charset="0"/>
+                    </a:rPr>
+                    <a:t>(b)</a:t>
+                  </a:r>
+                  <a14:m>
+                    <m:oMath xmlns:m="http://schemas.openxmlformats.org/officeDocument/2006/math">
+                      <m:r>
+                        <a:rPr lang="en-US" b="0" i="1" smtClean="0">
+                          <a:latin typeface="Cambria Math" panose="02040503050406030204" pitchFamily="18" charset="0"/>
+                        </a:rPr>
+                        <m:t>  </m:t>
+                      </m:r>
+                      <m:sSup>
+                        <m:sSupPr>
+                          <m:ctrlPr>
+                            <a:rPr lang="en-US" b="0" i="1" smtClean="0">
+                              <a:latin typeface="Cambria Math" panose="02040503050406030204" pitchFamily="18" charset="0"/>
+                            </a:rPr>
+                          </m:ctrlPr>
+                        </m:sSupPr>
+                        <m:e>
+                          <m:acc>
+                            <m:accPr>
+                              <m:chr m:val="̂"/>
+                              <m:ctrlPr>
+                                <a:rPr lang="en-US" i="1">
+                                  <a:latin typeface="Cambria Math" panose="02040503050406030204" pitchFamily="18" charset="0"/>
+                                </a:rPr>
+                              </m:ctrlPr>
+                            </m:accPr>
+                            <m:e>
+                              <m:r>
+                                <a:rPr lang="en-US" b="0" i="1" smtClean="0">
+                                  <a:latin typeface="Cambria Math" panose="02040503050406030204" pitchFamily="18" charset="0"/>
+                                </a:rPr>
+                                <m:t>𝑆</m:t>
+                              </m:r>
+                            </m:e>
+                          </m:acc>
+                        </m:e>
+                        <m:sup>
+                          <m:r>
+                            <a:rPr lang="en-US" b="0" i="1" smtClean="0">
+                              <a:latin typeface="Cambria Math" panose="02040503050406030204" pitchFamily="18" charset="0"/>
+                            </a:rPr>
+                            <m:t>2  </m:t>
+                          </m:r>
+                        </m:sup>
+                      </m:sSup>
+                    </m:oMath>
+                  </a14:m>
+                  <a:r>
+                    <a:rPr lang="en-US" dirty="0">
+                      <a:latin typeface="Helvetica Neue" panose="02000503000000020004" pitchFamily="2" charset="0"/>
+                      <a:ea typeface="Helvetica Neue" panose="02000503000000020004" pitchFamily="2" charset="0"/>
+                      <a:cs typeface="Helvetica Neue" panose="02000503000000020004" pitchFamily="2" charset="0"/>
+                    </a:rPr>
+                    <a:t>operator covariance</a:t>
+                  </a:r>
+                </a:p>
+              </p:txBody>
+            </p:sp>
+          </mc:Choice>
+          <mc:Fallback>
+            <p:sp>
+              <p:nvSpPr>
+                <p:cNvPr id="8" name="TextBox 7">
+                  <a:extLst>
+                    <a:ext uri="{FF2B5EF4-FFF2-40B4-BE49-F238E27FC236}">
+                      <a16:creationId xmlns:a16="http://schemas.microsoft.com/office/drawing/2014/main" id="{9D923AA2-8CED-5FA1-992D-66EE911D6892}"/>
+                    </a:ext>
+                  </a:extLst>
+                </p:cNvPr>
+                <p:cNvSpPr txBox="1">
+                  <a:spLocks noRot="1" noChangeAspect="1" noMove="1" noResize="1" noEditPoints="1" noAdjustHandles="1" noChangeArrowheads="1" noChangeShapeType="1" noTextEdit="1"/>
+                </p:cNvSpPr>
+                <p:nvPr/>
+              </p:nvSpPr>
+              <p:spPr>
+                <a:xfrm>
+                  <a:off x="4398227" y="3941291"/>
+                  <a:ext cx="2926314" cy="378758"/>
+                </a:xfrm>
+                <a:prstGeom prst="rect">
+                  <a:avLst/>
+                </a:prstGeom>
+                <a:blipFill>
+                  <a:blip r:embed="rId8"/>
+                  <a:stretch>
+                    <a:fillRect l="-2165" t="-10000" r="-433" b="-23333"/>
+                  </a:stretch>
+                </a:blipFill>
+              </p:spPr>
+              <p:txBody>
+                <a:bodyPr/>
+                <a:lstStyle/>
+                <a:p>
+                  <a:r>
+                    <a:rPr lang="en-US">
+                      <a:noFill/>
+                    </a:rPr>
+                    <a:t> </a:t>
+                  </a:r>
+                </a:p>
+              </p:txBody>
+            </p:sp>
+          </mc:Fallback>
+        </mc:AlternateContent>
       </p:grpSp>
     </p:spTree>
     <p:extLst>

</xml_diff>